<commit_message>
Add 4-5-9 region maps to P14 presentation
</commit_message>
<xml_diff>
--- a/paw/P14_yft_model_development/p14_yft_model_development.pptx
+++ b/paw/P14_yft_model_development/p14_yft_model_development.pptx
@@ -5,10 +5,10 @@
     <p:sldMasterId id="2147483660" r:id="rId3"/>
   </p:sldMasterIdLst>
   <p:notesMasterIdLst>
-    <p:notesMasterId r:id="rId27"/>
+    <p:notesMasterId r:id="rId31"/>
   </p:notesMasterIdLst>
   <p:handoutMasterIdLst>
-    <p:handoutMasterId r:id="rId28"/>
+    <p:handoutMasterId r:id="rId32"/>
   </p:handoutMasterIdLst>
   <p:sldIdLst>
     <p:sldId id="564" r:id="rId4"/>
@@ -32,13 +32,17 @@
     <p:sldId id="594" r:id="rId22"/>
     <p:sldId id="589" r:id="rId23"/>
     <p:sldId id="595" r:id="rId24"/>
-    <p:sldId id="596" r:id="rId25"/>
-    <p:sldId id="597" r:id="rId26"/>
+    <p:sldId id="598" r:id="rId25"/>
+    <p:sldId id="599" r:id="rId26"/>
+    <p:sldId id="600" r:id="rId27"/>
+    <p:sldId id="601" r:id="rId28"/>
+    <p:sldId id="596" r:id="rId29"/>
+    <p:sldId id="597" r:id="rId30"/>
   </p:sldIdLst>
   <p:sldSz cx="12192000" cy="6858000"/>
   <p:notesSz cx="6858000" cy="9144000"/>
   <p:custDataLst>
-    <p:tags r:id="rId29"/>
+    <p:tags r:id="rId33"/>
   </p:custDataLst>
   <p:defaultTextStyle>
     <a:defPPr>
@@ -7040,6 +7044,634 @@
           <a:p>
             <a:r>
               <a:rPr lang="en-AU" b="1" cap="none"/>
+              <a:t>Model Complexity</a:t>
+            </a:r>
+          </a:p>
+        </p:txBody>
+      </p:sp>
+      <p:sp>
+        <p:nvSpPr>
+          <p:cNvPr id="3" name="Content Placeholder 2">
+            <a:extLst>
+              <a:ext uri="{FF2B5EF4-FFF2-40B4-BE49-F238E27FC236}">
+                <a16:creationId xmlns:a16="http://schemas.microsoft.com/office/drawing/2014/main" id="{D4C7B753-F6AF-BBA0-8F57-CC0C08DA57FE}"/>
+              </a:ext>
+            </a:extLst>
+          </p:cNvPr>
+          <p:cNvSpPr>
+            <a:spLocks noGrp="1"/>
+          </p:cNvSpPr>
+          <p:nvPr>
+            <p:ph idx="1"/>
+          </p:nvPr>
+        </p:nvSpPr>
+        <p:spPr>
+          <a:xfrm>
+            <a:off x="1478462" y="2197947"/>
+            <a:ext cx="10011921" cy="3937382"/>
+          </a:xfrm>
+        </p:spPr>
+        <p:txBody>
+          <a:bodyPr/>
+          <a:lstStyle/>
+          <a:p>
+            <a:pPr marL="0" indent="0" defTabSz="541338">
+              <a:spcBef>
+                <a:spcPts val="0"/>
+              </a:spcBef>
+              <a:spcAft>
+                <a:spcPts val="2400"/>
+              </a:spcAft>
+              <a:buNone/>
+            </a:pPr>
+            <a:r>
+              <a:rPr lang="en-US"/>
+              <a:t>With the YFT 2020 assessment model, often a small change in the model settings</a:t>
+            </a:r>
+            <a:br>
+              <a:rPr lang="en-US"/>
+            </a:br>
+            <a:r>
+              <a:rPr lang="en-US"/>
+              <a:t>causes large differences in the model fit and the estimated stock status, or prevents</a:t>
+            </a:r>
+            <a:br>
+              <a:rPr lang="en-US"/>
+            </a:br>
+            <a:r>
+              <a:rPr lang="en-US"/>
+              <a:t>model convergence</a:t>
+            </a:r>
+          </a:p>
+          <a:p>
+            <a:pPr marL="0" indent="0" defTabSz="541338">
+              <a:spcBef>
+                <a:spcPts val="0"/>
+              </a:spcBef>
+              <a:spcAft>
+                <a:spcPts val="2400"/>
+              </a:spcAft>
+              <a:buNone/>
+            </a:pPr>
+            <a:r>
+              <a:rPr lang="en-US"/>
+              <a:t>The high sensitivity to small changes in model assumptions, as well as a general</a:t>
+            </a:r>
+            <a:br>
+              <a:rPr lang="en-US"/>
+            </a:br>
+            <a:r>
+              <a:rPr lang="en-US"/>
+              <a:t>instability when fitting the model, are signs that the model complexity is too high</a:t>
+            </a:r>
+            <a:br>
+              <a:rPr lang="en-US"/>
+            </a:br>
+            <a:r>
+              <a:rPr lang="en-US"/>
+              <a:t>given the modest information in the data</a:t>
+            </a:r>
+          </a:p>
+          <a:p>
+            <a:pPr marL="0" indent="0" defTabSz="541338">
+              <a:spcBef>
+                <a:spcPts val="0"/>
+              </a:spcBef>
+              <a:spcAft>
+                <a:spcPts val="2400"/>
+              </a:spcAft>
+              <a:buNone/>
+            </a:pPr>
+            <a:r>
+              <a:rPr lang="en-US"/>
+              <a:t>Simplifying the model to have 4 or 5 regions could results in a model that is better</a:t>
+            </a:r>
+            <a:br>
+              <a:rPr lang="en-US"/>
+            </a:br>
+            <a:r>
+              <a:rPr lang="en-US"/>
+              <a:t>estimable and robust to small changes in assumptions - a more reliable tool for</a:t>
+            </a:r>
+            <a:br>
+              <a:rPr lang="en-US"/>
+            </a:br>
+            <a:r>
+              <a:rPr lang="en-US"/>
+              <a:t>providing management advice</a:t>
+            </a:r>
+          </a:p>
+        </p:txBody>
+      </p:sp>
+    </p:spTree>
+    <p:extLst>
+      <p:ext uri="{BB962C8B-B14F-4D97-AF65-F5344CB8AC3E}">
+        <p14:creationId xmlns:p14="http://schemas.microsoft.com/office/powerpoint/2010/main" val="4067115977"/>
+      </p:ext>
+    </p:extLst>
+  </p:cSld>
+  <p:clrMapOvr>
+    <a:masterClrMapping/>
+  </p:clrMapOvr>
+</p:sld>
+</file>
+
+<file path=ppt/slides/slide23.xml><?xml version="1.0" encoding="utf-8"?>
+<p:sld xmlns:a="http://schemas.openxmlformats.org/drawingml/2006/main" xmlns:r="http://schemas.openxmlformats.org/officeDocument/2006/relationships" xmlns:p="http://schemas.openxmlformats.org/presentationml/2006/main">
+  <p:cSld>
+    <p:spTree>
+      <p:nvGrpSpPr>
+        <p:cNvPr id="1" name=""/>
+        <p:cNvGrpSpPr/>
+        <p:nvPr/>
+      </p:nvGrpSpPr>
+      <p:grpSpPr>
+        <a:xfrm>
+          <a:off x="0" y="0"/>
+          <a:ext cx="0" cy="0"/>
+          <a:chOff x="0" y="0"/>
+          <a:chExt cx="0" cy="0"/>
+        </a:xfrm>
+      </p:grpSpPr>
+      <p:sp>
+        <p:nvSpPr>
+          <p:cNvPr id="2" name="Title 1">
+            <a:extLst>
+              <a:ext uri="{FF2B5EF4-FFF2-40B4-BE49-F238E27FC236}">
+                <a16:creationId xmlns:a16="http://schemas.microsoft.com/office/drawing/2014/main" id="{DAF151DF-1CFA-94B7-EF03-6B43B5EB28D3}"/>
+              </a:ext>
+            </a:extLst>
+          </p:cNvPr>
+          <p:cNvSpPr>
+            <a:spLocks noGrp="1"/>
+          </p:cNvSpPr>
+          <p:nvPr>
+            <p:ph type="title"/>
+          </p:nvPr>
+        </p:nvSpPr>
+        <p:spPr>
+          <a:xfrm>
+            <a:off x="628055" y="633348"/>
+            <a:ext cx="8839783" cy="541939"/>
+          </a:xfrm>
+        </p:spPr>
+        <p:txBody>
+          <a:bodyPr/>
+          <a:lstStyle/>
+          <a:p>
+            <a:r>
+              <a:rPr lang="en-AU" b="1" cap="none"/>
+              <a:t>Regions: 9, 4, or 5?</a:t>
+            </a:r>
+          </a:p>
+        </p:txBody>
+      </p:sp>
+      <p:pic>
+        <p:nvPicPr>
+          <p:cNvPr id="6" name="Picture 5" descr="Map&#10;&#10;Description automatically generated">
+            <a:extLst>
+              <a:ext uri="{FF2B5EF4-FFF2-40B4-BE49-F238E27FC236}">
+                <a16:creationId xmlns:a16="http://schemas.microsoft.com/office/drawing/2014/main" id="{BD0C17F3-028B-6A41-FF1C-4AF11C134AF4}"/>
+              </a:ext>
+            </a:extLst>
+          </p:cNvPr>
+          <p:cNvPicPr>
+            <a:picLocks noChangeAspect="1"/>
+          </p:cNvPicPr>
+          <p:nvPr/>
+        </p:nvPicPr>
+        <p:blipFill>
+          <a:blip r:embed="rId2"/>
+          <a:stretch>
+            <a:fillRect/>
+          </a:stretch>
+        </p:blipFill>
+        <p:spPr>
+          <a:xfrm>
+            <a:off x="2197180" y="1556637"/>
+            <a:ext cx="7797641" cy="5514023"/>
+          </a:xfrm>
+          <a:prstGeom prst="rect">
+            <a:avLst/>
+          </a:prstGeom>
+        </p:spPr>
+      </p:pic>
+    </p:spTree>
+    <p:extLst>
+      <p:ext uri="{BB962C8B-B14F-4D97-AF65-F5344CB8AC3E}">
+        <p14:creationId xmlns:p14="http://schemas.microsoft.com/office/powerpoint/2010/main" val="2425442501"/>
+      </p:ext>
+    </p:extLst>
+  </p:cSld>
+  <p:clrMapOvr>
+    <a:masterClrMapping/>
+  </p:clrMapOvr>
+</p:sld>
+</file>
+
+<file path=ppt/slides/slide24.xml><?xml version="1.0" encoding="utf-8"?>
+<p:sld xmlns:a="http://schemas.openxmlformats.org/drawingml/2006/main" xmlns:r="http://schemas.openxmlformats.org/officeDocument/2006/relationships" xmlns:p="http://schemas.openxmlformats.org/presentationml/2006/main">
+  <p:cSld>
+    <p:spTree>
+      <p:nvGrpSpPr>
+        <p:cNvPr id="1" name=""/>
+        <p:cNvGrpSpPr/>
+        <p:nvPr/>
+      </p:nvGrpSpPr>
+      <p:grpSpPr>
+        <a:xfrm>
+          <a:off x="0" y="0"/>
+          <a:ext cx="0" cy="0"/>
+          <a:chOff x="0" y="0"/>
+          <a:chExt cx="0" cy="0"/>
+        </a:xfrm>
+      </p:grpSpPr>
+      <p:sp>
+        <p:nvSpPr>
+          <p:cNvPr id="2" name="Title 1">
+            <a:extLst>
+              <a:ext uri="{FF2B5EF4-FFF2-40B4-BE49-F238E27FC236}">
+                <a16:creationId xmlns:a16="http://schemas.microsoft.com/office/drawing/2014/main" id="{DAF151DF-1CFA-94B7-EF03-6B43B5EB28D3}"/>
+              </a:ext>
+            </a:extLst>
+          </p:cNvPr>
+          <p:cNvSpPr>
+            <a:spLocks noGrp="1"/>
+          </p:cNvSpPr>
+          <p:nvPr>
+            <p:ph type="title"/>
+          </p:nvPr>
+        </p:nvSpPr>
+        <p:spPr>
+          <a:xfrm>
+            <a:off x="628055" y="633348"/>
+            <a:ext cx="8839783" cy="541939"/>
+          </a:xfrm>
+        </p:spPr>
+        <p:txBody>
+          <a:bodyPr/>
+          <a:lstStyle/>
+          <a:p>
+            <a:r>
+              <a:rPr lang="en-AU" b="1" cap="none"/>
+              <a:t>Regions: 9, 4, or 5?</a:t>
+            </a:r>
+          </a:p>
+        </p:txBody>
+      </p:sp>
+      <p:pic>
+        <p:nvPicPr>
+          <p:cNvPr id="8" name="Picture 7" descr="Chart, scatter chart&#10;&#10;Description automatically generated">
+            <a:extLst>
+              <a:ext uri="{FF2B5EF4-FFF2-40B4-BE49-F238E27FC236}">
+                <a16:creationId xmlns:a16="http://schemas.microsoft.com/office/drawing/2014/main" id="{C865CE4C-DBBD-E703-7241-4F4228DDA55C}"/>
+              </a:ext>
+            </a:extLst>
+          </p:cNvPr>
+          <p:cNvPicPr>
+            <a:picLocks noChangeAspect="1"/>
+          </p:cNvPicPr>
+          <p:nvPr/>
+        </p:nvPicPr>
+        <p:blipFill>
+          <a:blip r:embed="rId2"/>
+          <a:stretch>
+            <a:fillRect/>
+          </a:stretch>
+        </p:blipFill>
+        <p:spPr>
+          <a:xfrm>
+            <a:off x="2197180" y="1556637"/>
+            <a:ext cx="7797641" cy="5514023"/>
+          </a:xfrm>
+          <a:prstGeom prst="rect">
+            <a:avLst/>
+          </a:prstGeom>
+        </p:spPr>
+      </p:pic>
+    </p:spTree>
+    <p:extLst>
+      <p:ext uri="{BB962C8B-B14F-4D97-AF65-F5344CB8AC3E}">
+        <p14:creationId xmlns:p14="http://schemas.microsoft.com/office/powerpoint/2010/main" val="2954623525"/>
+      </p:ext>
+    </p:extLst>
+  </p:cSld>
+  <p:clrMapOvr>
+    <a:masterClrMapping/>
+  </p:clrMapOvr>
+</p:sld>
+</file>
+
+<file path=ppt/slides/slide25.xml><?xml version="1.0" encoding="utf-8"?>
+<p:sld xmlns:a="http://schemas.openxmlformats.org/drawingml/2006/main" xmlns:r="http://schemas.openxmlformats.org/officeDocument/2006/relationships" xmlns:p="http://schemas.openxmlformats.org/presentationml/2006/main">
+  <p:cSld>
+    <p:spTree>
+      <p:nvGrpSpPr>
+        <p:cNvPr id="1" name=""/>
+        <p:cNvGrpSpPr/>
+        <p:nvPr/>
+      </p:nvGrpSpPr>
+      <p:grpSpPr>
+        <a:xfrm>
+          <a:off x="0" y="0"/>
+          <a:ext cx="0" cy="0"/>
+          <a:chOff x="0" y="0"/>
+          <a:chExt cx="0" cy="0"/>
+        </a:xfrm>
+      </p:grpSpPr>
+      <p:sp>
+        <p:nvSpPr>
+          <p:cNvPr id="2" name="Title 1">
+            <a:extLst>
+              <a:ext uri="{FF2B5EF4-FFF2-40B4-BE49-F238E27FC236}">
+                <a16:creationId xmlns:a16="http://schemas.microsoft.com/office/drawing/2014/main" id="{DAF151DF-1CFA-94B7-EF03-6B43B5EB28D3}"/>
+              </a:ext>
+            </a:extLst>
+          </p:cNvPr>
+          <p:cNvSpPr>
+            <a:spLocks noGrp="1"/>
+          </p:cNvSpPr>
+          <p:nvPr>
+            <p:ph type="title"/>
+          </p:nvPr>
+        </p:nvSpPr>
+        <p:spPr>
+          <a:xfrm>
+            <a:off x="628055" y="633348"/>
+            <a:ext cx="8839783" cy="541939"/>
+          </a:xfrm>
+        </p:spPr>
+        <p:txBody>
+          <a:bodyPr/>
+          <a:lstStyle/>
+          <a:p>
+            <a:r>
+              <a:rPr lang="en-AU" b="1" cap="none"/>
+              <a:t>Regions: 9, 4, or 5?</a:t>
+            </a:r>
+          </a:p>
+        </p:txBody>
+      </p:sp>
+      <p:pic>
+        <p:nvPicPr>
+          <p:cNvPr id="8" name="Picture 7" descr="Chart, scatter chart&#10;&#10;Description automatically generated">
+            <a:extLst>
+              <a:ext uri="{FF2B5EF4-FFF2-40B4-BE49-F238E27FC236}">
+                <a16:creationId xmlns:a16="http://schemas.microsoft.com/office/drawing/2014/main" id="{C865CE4C-DBBD-E703-7241-4F4228DDA55C}"/>
+              </a:ext>
+            </a:extLst>
+          </p:cNvPr>
+          <p:cNvPicPr>
+            <a:picLocks noChangeAspect="1"/>
+          </p:cNvPicPr>
+          <p:nvPr/>
+        </p:nvPicPr>
+        <p:blipFill>
+          <a:blip r:embed="rId2"/>
+          <a:stretch>
+            <a:fillRect/>
+          </a:stretch>
+        </p:blipFill>
+        <p:spPr>
+          <a:xfrm>
+            <a:off x="2197180" y="1556637"/>
+            <a:ext cx="7797641" cy="5514023"/>
+          </a:xfrm>
+          <a:prstGeom prst="rect">
+            <a:avLst/>
+          </a:prstGeom>
+        </p:spPr>
+      </p:pic>
+      <p:cxnSp>
+        <p:nvCxnSpPr>
+          <p:cNvPr id="5" name="Straight Connector 4">
+            <a:extLst>
+              <a:ext uri="{FF2B5EF4-FFF2-40B4-BE49-F238E27FC236}">
+                <a16:creationId xmlns:a16="http://schemas.microsoft.com/office/drawing/2014/main" id="{97DD6938-3B63-4C4D-7077-757A0938908B}"/>
+              </a:ext>
+            </a:extLst>
+          </p:cNvPr>
+          <p:cNvCxnSpPr>
+            <a:cxnSpLocks/>
+          </p:cNvCxnSpPr>
+          <p:nvPr/>
+        </p:nvCxnSpPr>
+        <p:spPr>
+          <a:xfrm>
+            <a:off x="4348163" y="4167188"/>
+            <a:ext cx="674687" cy="0"/>
+          </a:xfrm>
+          <a:prstGeom prst="line">
+            <a:avLst/>
+          </a:prstGeom>
+          <a:ln w="88900">
+            <a:solidFill>
+              <a:srgbClr val="611729"/>
+            </a:solidFill>
+          </a:ln>
+        </p:spPr>
+        <p:style>
+          <a:lnRef idx="1">
+            <a:schemeClr val="accent1"/>
+          </a:lnRef>
+          <a:fillRef idx="0">
+            <a:schemeClr val="accent1"/>
+          </a:fillRef>
+          <a:effectRef idx="0">
+            <a:schemeClr val="accent1"/>
+          </a:effectRef>
+          <a:fontRef idx="minor">
+            <a:schemeClr val="tx1"/>
+          </a:fontRef>
+        </p:style>
+      </p:cxnSp>
+      <p:cxnSp>
+        <p:nvCxnSpPr>
+          <p:cNvPr id="7" name="Straight Connector 6">
+            <a:extLst>
+              <a:ext uri="{FF2B5EF4-FFF2-40B4-BE49-F238E27FC236}">
+                <a16:creationId xmlns:a16="http://schemas.microsoft.com/office/drawing/2014/main" id="{FAE7B624-0E0F-B7BF-8E52-8AEF509EF641}"/>
+              </a:ext>
+            </a:extLst>
+          </p:cNvPr>
+          <p:cNvCxnSpPr>
+            <a:cxnSpLocks/>
+          </p:cNvCxnSpPr>
+          <p:nvPr/>
+        </p:nvCxnSpPr>
+        <p:spPr>
+          <a:xfrm flipV="1">
+            <a:off x="5022850" y="4122738"/>
+            <a:ext cx="0" cy="315912"/>
+          </a:xfrm>
+          <a:prstGeom prst="line">
+            <a:avLst/>
+          </a:prstGeom>
+          <a:ln w="88900">
+            <a:solidFill>
+              <a:srgbClr val="611729"/>
+            </a:solidFill>
+          </a:ln>
+        </p:spPr>
+        <p:style>
+          <a:lnRef idx="1">
+            <a:schemeClr val="accent1"/>
+          </a:lnRef>
+          <a:fillRef idx="0">
+            <a:schemeClr val="accent1"/>
+          </a:fillRef>
+          <a:effectRef idx="0">
+            <a:schemeClr val="accent1"/>
+          </a:effectRef>
+          <a:fontRef idx="minor">
+            <a:schemeClr val="tx1"/>
+          </a:fontRef>
+        </p:style>
+      </p:cxnSp>
+      <p:cxnSp>
+        <p:nvCxnSpPr>
+          <p:cNvPr id="10" name="Straight Connector 9">
+            <a:extLst>
+              <a:ext uri="{FF2B5EF4-FFF2-40B4-BE49-F238E27FC236}">
+                <a16:creationId xmlns:a16="http://schemas.microsoft.com/office/drawing/2014/main" id="{37045D4D-7ACE-D770-E6F1-9B268E4E0267}"/>
+              </a:ext>
+            </a:extLst>
+          </p:cNvPr>
+          <p:cNvCxnSpPr>
+            <a:cxnSpLocks/>
+          </p:cNvCxnSpPr>
+          <p:nvPr/>
+        </p:nvCxnSpPr>
+        <p:spPr>
+          <a:xfrm flipH="1">
+            <a:off x="5022850" y="4395788"/>
+            <a:ext cx="279400" cy="0"/>
+          </a:xfrm>
+          <a:prstGeom prst="line">
+            <a:avLst/>
+          </a:prstGeom>
+          <a:ln w="88900">
+            <a:solidFill>
+              <a:srgbClr val="611729"/>
+            </a:solidFill>
+          </a:ln>
+        </p:spPr>
+        <p:style>
+          <a:lnRef idx="1">
+            <a:schemeClr val="accent1"/>
+          </a:lnRef>
+          <a:fillRef idx="0">
+            <a:schemeClr val="accent1"/>
+          </a:fillRef>
+          <a:effectRef idx="0">
+            <a:schemeClr val="accent1"/>
+          </a:effectRef>
+          <a:fontRef idx="minor">
+            <a:schemeClr val="tx1"/>
+          </a:fontRef>
+        </p:style>
+      </p:cxnSp>
+      <p:cxnSp>
+        <p:nvCxnSpPr>
+          <p:cNvPr id="12" name="Straight Connector 11">
+            <a:extLst>
+              <a:ext uri="{FF2B5EF4-FFF2-40B4-BE49-F238E27FC236}">
+                <a16:creationId xmlns:a16="http://schemas.microsoft.com/office/drawing/2014/main" id="{23ED6220-26FB-017C-96C5-81ACB72700A8}"/>
+              </a:ext>
+            </a:extLst>
+          </p:cNvPr>
+          <p:cNvCxnSpPr>
+            <a:cxnSpLocks/>
+          </p:cNvCxnSpPr>
+          <p:nvPr/>
+        </p:nvCxnSpPr>
+        <p:spPr>
+          <a:xfrm flipV="1">
+            <a:off x="5257800" y="4395788"/>
+            <a:ext cx="0" cy="209550"/>
+          </a:xfrm>
+          <a:prstGeom prst="line">
+            <a:avLst/>
+          </a:prstGeom>
+          <a:ln w="88900">
+            <a:solidFill>
+              <a:srgbClr val="611729"/>
+            </a:solidFill>
+          </a:ln>
+        </p:spPr>
+        <p:style>
+          <a:lnRef idx="1">
+            <a:schemeClr val="accent1"/>
+          </a:lnRef>
+          <a:fillRef idx="0">
+            <a:schemeClr val="accent1"/>
+          </a:fillRef>
+          <a:effectRef idx="0">
+            <a:schemeClr val="accent1"/>
+          </a:effectRef>
+          <a:fontRef idx="minor">
+            <a:schemeClr val="tx1"/>
+          </a:fontRef>
+        </p:style>
+      </p:cxnSp>
+    </p:spTree>
+    <p:extLst>
+      <p:ext uri="{BB962C8B-B14F-4D97-AF65-F5344CB8AC3E}">
+        <p14:creationId xmlns:p14="http://schemas.microsoft.com/office/powerpoint/2010/main" val="523824485"/>
+      </p:ext>
+    </p:extLst>
+  </p:cSld>
+  <p:clrMapOvr>
+    <a:masterClrMapping/>
+  </p:clrMapOvr>
+</p:sld>
+</file>
+
+<file path=ppt/slides/slide26.xml><?xml version="1.0" encoding="utf-8"?>
+<p:sld xmlns:a="http://schemas.openxmlformats.org/drawingml/2006/main" xmlns:r="http://schemas.openxmlformats.org/officeDocument/2006/relationships" xmlns:p="http://schemas.openxmlformats.org/presentationml/2006/main">
+  <p:cSld>
+    <p:spTree>
+      <p:nvGrpSpPr>
+        <p:cNvPr id="1" name=""/>
+        <p:cNvGrpSpPr/>
+        <p:nvPr/>
+      </p:nvGrpSpPr>
+      <p:grpSpPr>
+        <a:xfrm>
+          <a:off x="0" y="0"/>
+          <a:ext cx="0" cy="0"/>
+          <a:chOff x="0" y="0"/>
+          <a:chExt cx="0" cy="0"/>
+        </a:xfrm>
+      </p:grpSpPr>
+      <p:sp>
+        <p:nvSpPr>
+          <p:cNvPr id="2" name="Title 1">
+            <a:extLst>
+              <a:ext uri="{FF2B5EF4-FFF2-40B4-BE49-F238E27FC236}">
+                <a16:creationId xmlns:a16="http://schemas.microsoft.com/office/drawing/2014/main" id="{DAF151DF-1CFA-94B7-EF03-6B43B5EB28D3}"/>
+              </a:ext>
+            </a:extLst>
+          </p:cNvPr>
+          <p:cNvSpPr>
+            <a:spLocks noGrp="1"/>
+          </p:cNvSpPr>
+          <p:nvPr>
+            <p:ph type="title"/>
+          </p:nvPr>
+        </p:nvSpPr>
+        <p:spPr>
+          <a:xfrm>
+            <a:off x="628055" y="633348"/>
+            <a:ext cx="8839783" cy="541939"/>
+          </a:xfrm>
+        </p:spPr>
+        <p:txBody>
+          <a:bodyPr/>
+          <a:lstStyle/>
+          <a:p>
+            <a:r>
+              <a:rPr lang="en-AU" b="1" cap="none"/>
               <a:t>Exploratory Model Runs</a:t>
             </a:r>
           </a:p>
@@ -7088,7 +7720,7 @@
 </p:sld>
 </file>
 
-<file path=ppt/slides/slide23.xml><?xml version="1.0" encoding="utf-8"?>
+<file path=ppt/slides/slide27.xml><?xml version="1.0" encoding="utf-8"?>
 <p:sld xmlns:a="http://schemas.openxmlformats.org/drawingml/2006/main" xmlns:r="http://schemas.openxmlformats.org/officeDocument/2006/relationships" xmlns:p="http://schemas.openxmlformats.org/presentationml/2006/main">
   <p:cSld>
     <p:spTree>
@@ -11086,10 +11718,6 @@
 </file>
 
 <file path=customXml/item1.xml><?xml version="1.0" encoding="utf-8"?>
-<LongProperties xmlns="http://schemas.microsoft.com/office/2006/metadata/longProperties"/>
-</file>
-
-<file path=customXml/item2.xml><?xml version="1.0" encoding="utf-8"?>
 <ct:contentTypeSchema xmlns:ct="http://schemas.microsoft.com/office/2006/metadata/contentType" xmlns:ma="http://schemas.microsoft.com/office/2006/metadata/properties/metaAttributes" ct:_="" ma:_="" ma:contentTypeName="Image" ma:contentTypeID="0x0101009148F5A04DDD49CBA7127AADA5FB792B00AADE34325A8B49CDA8BB4DB53328F214006A765002D452E24C8161B399DF4F27FF" ma:contentTypeVersion="1" ma:contentTypeDescription="Upload an image." ma:contentTypeScope="" ma:versionID="6e7009a4ad8991cd36ace639d9bcf2b8">
   <xsd:schema xmlns:xsd="http://www.w3.org/2001/XMLSchema" xmlns:xs="http://www.w3.org/2001/XMLSchema" xmlns:p="http://schemas.microsoft.com/office/2006/metadata/properties" xmlns:ns1="http://schemas.microsoft.com/sharepoint/v3" xmlns:ns2="A1466F99-592D-4FBE-9C5A-71C070495048" xmlns:ns3="http://schemas.microsoft.com/sharepoint/v3/fields" targetNamespace="http://schemas.microsoft.com/office/2006/metadata/properties" ma:root="true" ma:fieldsID="710a743070e8514070b5db36cb601e64" ns1:_="" ns2:_="" ns3:_="">
     <xsd:import namespace="http://schemas.microsoft.com/sharepoint/v3"/>
@@ -11291,15 +11919,11 @@
 </ct:contentTypeSchema>
 </file>
 
-<file path=customXml/itemProps1.xml><?xml version="1.0" encoding="utf-8"?>
-<ds:datastoreItem xmlns:ds="http://schemas.openxmlformats.org/officeDocument/2006/customXml" ds:itemID="{8F603638-19FA-4B2F-AE24-F3EF444F5FBE}">
-  <ds:schemaRefs>
-    <ds:schemaRef ds:uri="http://schemas.microsoft.com/office/2006/metadata/longProperties"/>
-  </ds:schemaRefs>
-</ds:datastoreItem>
+<file path=customXml/item2.xml><?xml version="1.0" encoding="utf-8"?>
+<LongProperties xmlns="http://schemas.microsoft.com/office/2006/metadata/longProperties"/>
 </file>
 
-<file path=customXml/itemProps2.xml><?xml version="1.0" encoding="utf-8"?>
+<file path=customXml/itemProps1.xml><?xml version="1.0" encoding="utf-8"?>
 <ds:datastoreItem xmlns:ds="http://schemas.openxmlformats.org/officeDocument/2006/customXml" ds:itemID="{FDAC1897-61B3-4621-B0E2-FA327AD0B394}">
   <ds:schemaRefs>
     <ds:schemaRef ds:uri="http://schemas.microsoft.com/office/2006/metadata/contentType"/>
@@ -11317,4 +11941,12 @@
     <ds:schemaRef ds:uri="http://schemas.microsoft.com/internal/obd"/>
   </ds:schemaRefs>
 </ds:datastoreItem>
+</file>
+
+<file path=customXml/itemProps2.xml><?xml version="1.0" encoding="utf-8"?>
+<ds:datastoreItem xmlns:ds="http://schemas.openxmlformats.org/officeDocument/2006/customXml" ds:itemID="{8F603638-19FA-4B2F-AE24-F3EF444F5FBE}">
+  <ds:schemaRefs>
+    <ds:schemaRef ds:uri="http://schemas.microsoft.com/office/2006/metadata/longProperties"/>
+  </ds:schemaRefs>
+</ds:datastoreItem>
 </file>
</xml_diff>